<commit_message>
CH Changes Prior to team review
</commit_message>
<xml_diff>
--- a/figs/dags.pptx
+++ b/figs/dags.pptx
@@ -247,7 +247,7 @@
           <a:p>
             <a:fld id="{506EAD7B-3220-4062-ABF3-AE7B50D371F6}" type="datetimeFigureOut">
               <a:rPr lang="en-GB" smtClean="0"/>
-              <a:t>26/07/2021</a:t>
+              <a:t>22/02/2022</a:t>
             </a:fld>
             <a:endParaRPr lang="en-GB"/>
           </a:p>
@@ -417,7 +417,7 @@
           <a:p>
             <a:fld id="{506EAD7B-3220-4062-ABF3-AE7B50D371F6}" type="datetimeFigureOut">
               <a:rPr lang="en-GB" smtClean="0"/>
-              <a:t>26/07/2021</a:t>
+              <a:t>22/02/2022</a:t>
             </a:fld>
             <a:endParaRPr lang="en-GB"/>
           </a:p>
@@ -597,7 +597,7 @@
           <a:p>
             <a:fld id="{506EAD7B-3220-4062-ABF3-AE7B50D371F6}" type="datetimeFigureOut">
               <a:rPr lang="en-GB" smtClean="0"/>
-              <a:t>26/07/2021</a:t>
+              <a:t>22/02/2022</a:t>
             </a:fld>
             <a:endParaRPr lang="en-GB"/>
           </a:p>
@@ -767,7 +767,7 @@
           <a:p>
             <a:fld id="{506EAD7B-3220-4062-ABF3-AE7B50D371F6}" type="datetimeFigureOut">
               <a:rPr lang="en-GB" smtClean="0"/>
-              <a:t>26/07/2021</a:t>
+              <a:t>22/02/2022</a:t>
             </a:fld>
             <a:endParaRPr lang="en-GB"/>
           </a:p>
@@ -1013,7 +1013,7 @@
           <a:p>
             <a:fld id="{506EAD7B-3220-4062-ABF3-AE7B50D371F6}" type="datetimeFigureOut">
               <a:rPr lang="en-GB" smtClean="0"/>
-              <a:t>26/07/2021</a:t>
+              <a:t>22/02/2022</a:t>
             </a:fld>
             <a:endParaRPr lang="en-GB"/>
           </a:p>
@@ -1245,7 +1245,7 @@
           <a:p>
             <a:fld id="{506EAD7B-3220-4062-ABF3-AE7B50D371F6}" type="datetimeFigureOut">
               <a:rPr lang="en-GB" smtClean="0"/>
-              <a:t>26/07/2021</a:t>
+              <a:t>22/02/2022</a:t>
             </a:fld>
             <a:endParaRPr lang="en-GB"/>
           </a:p>
@@ -1612,7 +1612,7 @@
           <a:p>
             <a:fld id="{506EAD7B-3220-4062-ABF3-AE7B50D371F6}" type="datetimeFigureOut">
               <a:rPr lang="en-GB" smtClean="0"/>
-              <a:t>26/07/2021</a:t>
+              <a:t>22/02/2022</a:t>
             </a:fld>
             <a:endParaRPr lang="en-GB"/>
           </a:p>
@@ -1730,7 +1730,7 @@
           <a:p>
             <a:fld id="{506EAD7B-3220-4062-ABF3-AE7B50D371F6}" type="datetimeFigureOut">
               <a:rPr lang="en-GB" smtClean="0"/>
-              <a:t>26/07/2021</a:t>
+              <a:t>22/02/2022</a:t>
             </a:fld>
             <a:endParaRPr lang="en-GB"/>
           </a:p>
@@ -1825,7 +1825,7 @@
           <a:p>
             <a:fld id="{506EAD7B-3220-4062-ABF3-AE7B50D371F6}" type="datetimeFigureOut">
               <a:rPr lang="en-GB" smtClean="0"/>
-              <a:t>26/07/2021</a:t>
+              <a:t>22/02/2022</a:t>
             </a:fld>
             <a:endParaRPr lang="en-GB"/>
           </a:p>
@@ -2102,7 +2102,7 @@
           <a:p>
             <a:fld id="{506EAD7B-3220-4062-ABF3-AE7B50D371F6}" type="datetimeFigureOut">
               <a:rPr lang="en-GB" smtClean="0"/>
-              <a:t>26/07/2021</a:t>
+              <a:t>22/02/2022</a:t>
             </a:fld>
             <a:endParaRPr lang="en-GB"/>
           </a:p>
@@ -2355,7 +2355,7 @@
           <a:p>
             <a:fld id="{506EAD7B-3220-4062-ABF3-AE7B50D371F6}" type="datetimeFigureOut">
               <a:rPr lang="en-GB" smtClean="0"/>
-              <a:t>26/07/2021</a:t>
+              <a:t>22/02/2022</a:t>
             </a:fld>
             <a:endParaRPr lang="en-GB"/>
           </a:p>
@@ -2568,7 +2568,7 @@
           <a:p>
             <a:fld id="{506EAD7B-3220-4062-ABF3-AE7B50D371F6}" type="datetimeFigureOut">
               <a:rPr lang="en-GB" smtClean="0"/>
-              <a:t>26/07/2021</a:t>
+              <a:t>22/02/2022</a:t>
             </a:fld>
             <a:endParaRPr lang="en-GB"/>
           </a:p>
@@ -4121,8 +4121,8 @@
             </a:p>
           </p:txBody>
         </p:sp>
-        <mc:AlternateContent xmlns:mc="http://schemas.openxmlformats.org/markup-compatibility/2006">
-          <mc:Choice xmlns:a14="http://schemas.microsoft.com/office/drawing/2010/main" Requires="a14">
+        <mc:AlternateContent xmlns:mc="http://schemas.openxmlformats.org/markup-compatibility/2006" xmlns:a14="http://schemas.microsoft.com/office/drawing/2010/main">
+          <mc:Choice Requires="a14">
             <p:sp>
               <p:nvSpPr>
                 <p:cNvPr id="56" name="TextBox 55">
@@ -4151,6 +4151,7 @@
                 </a:bodyPr>
                 <a:lstStyle/>
                 <a:p>
+                  <a:pPr/>
                   <a14:m>
                     <m:oMathPara xmlns:m="http://schemas.openxmlformats.org/officeDocument/2006/math">
                       <m:oMathParaPr>
@@ -4196,7 +4197,7 @@
               </p:txBody>
             </p:sp>
           </mc:Choice>
-          <mc:Fallback>
+          <mc:Fallback xmlns="">
             <p:sp>
               <p:nvSpPr>
                 <p:cNvPr id="56" name="TextBox 55">
@@ -4312,8 +4313,8 @@
             </a:p>
           </p:txBody>
         </p:sp>
-        <mc:AlternateContent xmlns:mc="http://schemas.openxmlformats.org/markup-compatibility/2006">
-          <mc:Choice xmlns:a14="http://schemas.microsoft.com/office/drawing/2010/main" Requires="a14">
+        <mc:AlternateContent xmlns:mc="http://schemas.openxmlformats.org/markup-compatibility/2006" xmlns:a14="http://schemas.microsoft.com/office/drawing/2010/main">
+          <mc:Choice Requires="a14">
             <p:sp>
               <p:nvSpPr>
                 <p:cNvPr id="58" name="TextBox 57">
@@ -4342,6 +4343,7 @@
                 </a:bodyPr>
                 <a:lstStyle/>
                 <a:p>
+                  <a:pPr/>
                   <a14:m>
                     <m:oMathPara xmlns:m="http://schemas.openxmlformats.org/officeDocument/2006/math">
                       <m:oMathParaPr>
@@ -4387,7 +4389,7 @@
               </p:txBody>
             </p:sp>
           </mc:Choice>
-          <mc:Fallback>
+          <mc:Fallback xmlns="">
             <p:sp>
               <p:nvSpPr>
                 <p:cNvPr id="58" name="TextBox 57">
@@ -4503,8 +4505,8 @@
             </a:p>
           </p:txBody>
         </p:sp>
-        <mc:AlternateContent xmlns:mc="http://schemas.openxmlformats.org/markup-compatibility/2006">
-          <mc:Choice xmlns:a14="http://schemas.microsoft.com/office/drawing/2010/main" Requires="a14">
+        <mc:AlternateContent xmlns:mc="http://schemas.openxmlformats.org/markup-compatibility/2006" xmlns:a14="http://schemas.microsoft.com/office/drawing/2010/main">
+          <mc:Choice Requires="a14">
             <p:sp>
               <p:nvSpPr>
                 <p:cNvPr id="60" name="TextBox 59">
@@ -4533,6 +4535,7 @@
                 </a:bodyPr>
                 <a:lstStyle/>
                 <a:p>
+                  <a:pPr/>
                   <a14:m>
                     <m:oMathPara xmlns:m="http://schemas.openxmlformats.org/officeDocument/2006/math">
                       <m:oMathParaPr>
@@ -4578,7 +4581,7 @@
               </p:txBody>
             </p:sp>
           </mc:Choice>
-          <mc:Fallback>
+          <mc:Fallback xmlns="">
             <p:sp>
               <p:nvSpPr>
                 <p:cNvPr id="60" name="TextBox 59">
@@ -4688,8 +4691,8 @@
             </a:p>
           </p:txBody>
         </p:sp>
-        <mc:AlternateContent xmlns:mc="http://schemas.openxmlformats.org/markup-compatibility/2006">
-          <mc:Choice xmlns:a14="http://schemas.microsoft.com/office/drawing/2010/main" Requires="a14">
+        <mc:AlternateContent xmlns:mc="http://schemas.openxmlformats.org/markup-compatibility/2006" xmlns:a14="http://schemas.microsoft.com/office/drawing/2010/main">
+          <mc:Choice Requires="a14">
             <p:sp>
               <p:nvSpPr>
                 <p:cNvPr id="67" name="TextBox 66">
@@ -4718,6 +4721,7 @@
                 </a:bodyPr>
                 <a:lstStyle/>
                 <a:p>
+                  <a:pPr/>
                   <a14:m>
                     <m:oMathPara xmlns:m="http://schemas.openxmlformats.org/officeDocument/2006/math">
                       <m:oMathParaPr>
@@ -4775,7 +4779,7 @@
               </p:txBody>
             </p:sp>
           </mc:Choice>
-          <mc:Fallback>
+          <mc:Fallback xmlns="">
             <p:sp>
               <p:nvSpPr>
                 <p:cNvPr id="67" name="TextBox 66">
@@ -4885,8 +4889,8 @@
             </a:p>
           </p:txBody>
         </p:sp>
-        <mc:AlternateContent xmlns:mc="http://schemas.openxmlformats.org/markup-compatibility/2006">
-          <mc:Choice xmlns:a14="http://schemas.microsoft.com/office/drawing/2010/main" Requires="a14">
+        <mc:AlternateContent xmlns:mc="http://schemas.openxmlformats.org/markup-compatibility/2006" xmlns:a14="http://schemas.microsoft.com/office/drawing/2010/main">
+          <mc:Choice Requires="a14">
             <p:sp>
               <p:nvSpPr>
                 <p:cNvPr id="68" name="TextBox 67">
@@ -4915,6 +4919,7 @@
                 </a:bodyPr>
                 <a:lstStyle/>
                 <a:p>
+                  <a:pPr/>
                   <a14:m>
                     <m:oMathPara xmlns:m="http://schemas.openxmlformats.org/officeDocument/2006/math">
                       <m:oMathParaPr>
@@ -4972,7 +4977,7 @@
               </p:txBody>
             </p:sp>
           </mc:Choice>
-          <mc:Fallback>
+          <mc:Fallback xmlns="">
             <p:sp>
               <p:nvSpPr>
                 <p:cNvPr id="68" name="TextBox 67">
@@ -5082,8 +5087,8 @@
             </a:p>
           </p:txBody>
         </p:sp>
-        <mc:AlternateContent xmlns:mc="http://schemas.openxmlformats.org/markup-compatibility/2006">
-          <mc:Choice xmlns:a14="http://schemas.microsoft.com/office/drawing/2010/main" Requires="a14">
+        <mc:AlternateContent xmlns:mc="http://schemas.openxmlformats.org/markup-compatibility/2006" xmlns:a14="http://schemas.microsoft.com/office/drawing/2010/main">
+          <mc:Choice Requires="a14">
             <p:sp>
               <p:nvSpPr>
                 <p:cNvPr id="69" name="TextBox 68">
@@ -5112,6 +5117,7 @@
                 </a:bodyPr>
                 <a:lstStyle/>
                 <a:p>
+                  <a:pPr/>
                   <a14:m>
                     <m:oMathPara xmlns:m="http://schemas.openxmlformats.org/officeDocument/2006/math">
                       <m:oMathParaPr>
@@ -5169,7 +5175,7 @@
               </p:txBody>
             </p:sp>
           </mc:Choice>
-          <mc:Fallback>
+          <mc:Fallback xmlns="">
             <p:sp>
               <p:nvSpPr>
                 <p:cNvPr id="69" name="TextBox 68">
@@ -5285,8 +5291,8 @@
             </a:p>
           </p:txBody>
         </p:sp>
-        <mc:AlternateContent xmlns:mc="http://schemas.openxmlformats.org/markup-compatibility/2006">
-          <mc:Choice xmlns:a14="http://schemas.microsoft.com/office/drawing/2010/main" Requires="a14">
+        <mc:AlternateContent xmlns:mc="http://schemas.openxmlformats.org/markup-compatibility/2006" xmlns:a14="http://schemas.microsoft.com/office/drawing/2010/main">
+          <mc:Choice Requires="a14">
             <p:sp>
               <p:nvSpPr>
                 <p:cNvPr id="79" name="TextBox 78">
@@ -5315,6 +5321,7 @@
                 </a:bodyPr>
                 <a:lstStyle/>
                 <a:p>
+                  <a:pPr/>
                   <a14:m>
                     <m:oMathPara xmlns:m="http://schemas.openxmlformats.org/officeDocument/2006/math">
                       <m:oMathParaPr>
@@ -5360,7 +5367,7 @@
               </p:txBody>
             </p:sp>
           </mc:Choice>
-          <mc:Fallback>
+          <mc:Fallback xmlns="">
             <p:sp>
               <p:nvSpPr>
                 <p:cNvPr id="79" name="TextBox 78">
@@ -5406,8 +5413,8 @@
           </mc:Fallback>
         </mc:AlternateContent>
       </p:grpSp>
-      <mc:AlternateContent xmlns:mc="http://schemas.openxmlformats.org/markup-compatibility/2006">
-        <mc:Choice xmlns:a14="http://schemas.microsoft.com/office/drawing/2010/main" Requires="a14">
+      <mc:AlternateContent xmlns:mc="http://schemas.openxmlformats.org/markup-compatibility/2006" xmlns:a14="http://schemas.microsoft.com/office/drawing/2010/main">
+        <mc:Choice Requires="a14">
           <p:sp>
             <p:nvSpPr>
               <p:cNvPr id="81" name="TextBox 80">
@@ -5436,6 +5443,7 @@
               </a:bodyPr>
               <a:lstStyle/>
               <a:p>
+                <a:pPr/>
                 <a14:m>
                   <m:oMathPara xmlns:m="http://schemas.openxmlformats.org/officeDocument/2006/math">
                     <m:oMathParaPr>
@@ -5481,7 +5489,7 @@
             </p:txBody>
           </p:sp>
         </mc:Choice>
-        <mc:Fallback>
+        <mc:Fallback xmlns="">
           <p:sp>
             <p:nvSpPr>
               <p:cNvPr id="81" name="TextBox 80">
@@ -5596,8 +5604,8 @@
             </a:p>
           </p:txBody>
         </p:sp>
-        <mc:AlternateContent xmlns:mc="http://schemas.openxmlformats.org/markup-compatibility/2006">
-          <mc:Choice xmlns:a14="http://schemas.microsoft.com/office/drawing/2010/main" Requires="a14">
+        <mc:AlternateContent xmlns:mc="http://schemas.openxmlformats.org/markup-compatibility/2006" xmlns:a14="http://schemas.microsoft.com/office/drawing/2010/main">
+          <mc:Choice Requires="a14">
             <p:sp>
               <p:nvSpPr>
                 <p:cNvPr id="82" name="TextBox 81">
@@ -5626,6 +5634,7 @@
                 </a:bodyPr>
                 <a:lstStyle/>
                 <a:p>
+                  <a:pPr/>
                   <a14:m>
                     <m:oMathPara xmlns:m="http://schemas.openxmlformats.org/officeDocument/2006/math">
                       <m:oMathParaPr>
@@ -5671,7 +5680,7 @@
               </p:txBody>
             </p:sp>
           </mc:Choice>
-          <mc:Fallback>
+          <mc:Fallback xmlns="">
             <p:sp>
               <p:nvSpPr>
                 <p:cNvPr id="82" name="TextBox 81">
@@ -5781,8 +5790,8 @@
             </a:p>
           </p:txBody>
         </p:sp>
-        <mc:AlternateContent xmlns:mc="http://schemas.openxmlformats.org/markup-compatibility/2006">
-          <mc:Choice xmlns:a14="http://schemas.microsoft.com/office/drawing/2010/main" Requires="a14">
+        <mc:AlternateContent xmlns:mc="http://schemas.openxmlformats.org/markup-compatibility/2006" xmlns:a14="http://schemas.microsoft.com/office/drawing/2010/main">
+          <mc:Choice Requires="a14">
             <p:sp>
               <p:nvSpPr>
                 <p:cNvPr id="84" name="TextBox 83">
@@ -5811,6 +5820,7 @@
                 </a:bodyPr>
                 <a:lstStyle/>
                 <a:p>
+                  <a:pPr/>
                   <a14:m>
                     <m:oMathPara xmlns:m="http://schemas.openxmlformats.org/officeDocument/2006/math">
                       <m:oMathParaPr>
@@ -5868,7 +5878,7 @@
               </p:txBody>
             </p:sp>
           </mc:Choice>
-          <mc:Fallback>
+          <mc:Fallback xmlns="">
             <p:sp>
               <p:nvSpPr>
                 <p:cNvPr id="84" name="TextBox 83">
@@ -5978,8 +5988,8 @@
             </a:p>
           </p:txBody>
         </p:sp>
-        <mc:AlternateContent xmlns:mc="http://schemas.openxmlformats.org/markup-compatibility/2006">
-          <mc:Choice xmlns:a14="http://schemas.microsoft.com/office/drawing/2010/main" Requires="a14">
+        <mc:AlternateContent xmlns:mc="http://schemas.openxmlformats.org/markup-compatibility/2006" xmlns:a14="http://schemas.microsoft.com/office/drawing/2010/main">
+          <mc:Choice Requires="a14">
             <p:sp>
               <p:nvSpPr>
                 <p:cNvPr id="86" name="TextBox 85">
@@ -6008,6 +6018,7 @@
                 </a:bodyPr>
                 <a:lstStyle/>
                 <a:p>
+                  <a:pPr/>
                   <a14:m>
                     <m:oMathPara xmlns:m="http://schemas.openxmlformats.org/officeDocument/2006/math">
                       <m:oMathParaPr>
@@ -6065,7 +6076,7 @@
               </p:txBody>
             </p:sp>
           </mc:Choice>
-          <mc:Fallback>
+          <mc:Fallback xmlns="">
             <p:sp>
               <p:nvSpPr>
                 <p:cNvPr id="86" name="TextBox 85">
@@ -6175,8 +6186,8 @@
             </a:p>
           </p:txBody>
         </p:sp>
-        <mc:AlternateContent xmlns:mc="http://schemas.openxmlformats.org/markup-compatibility/2006">
-          <mc:Choice xmlns:a14="http://schemas.microsoft.com/office/drawing/2010/main" Requires="a14">
+        <mc:AlternateContent xmlns:mc="http://schemas.openxmlformats.org/markup-compatibility/2006" xmlns:a14="http://schemas.microsoft.com/office/drawing/2010/main">
+          <mc:Choice Requires="a14">
             <p:sp>
               <p:nvSpPr>
                 <p:cNvPr id="87" name="TextBox 86">
@@ -6205,6 +6216,7 @@
                 </a:bodyPr>
                 <a:lstStyle/>
                 <a:p>
+                  <a:pPr/>
                   <a14:m>
                     <m:oMathPara xmlns:m="http://schemas.openxmlformats.org/officeDocument/2006/math">
                       <m:oMathParaPr>
@@ -6262,7 +6274,7 @@
               </p:txBody>
             </p:sp>
           </mc:Choice>
-          <mc:Fallback>
+          <mc:Fallback xmlns="">
             <p:sp>
               <p:nvSpPr>
                 <p:cNvPr id="87" name="TextBox 86">
@@ -6327,6 +6339,11 @@
             <a:chOff x="8851828" y="2424443"/>
             <a:chExt cx="826777" cy="875283"/>
           </a:xfrm>
+          <a:solidFill>
+            <a:schemeClr val="accent6">
+              <a:lumMod val="50000"/>
+            </a:schemeClr>
+          </a:solidFill>
         </p:grpSpPr>
         <p:sp>
           <p:nvSpPr>
@@ -6342,11 +6359,7 @@
             <a:prstGeom prst="ellipse">
               <a:avLst/>
             </a:prstGeom>
-            <a:solidFill>
-              <a:schemeClr val="accent6">
-                <a:lumMod val="75000"/>
-              </a:schemeClr>
-            </a:solidFill>
+            <a:grpFill/>
           </p:spPr>
           <p:style>
             <a:lnRef idx="2">
@@ -6377,8 +6390,8 @@
             </a:p>
           </p:txBody>
         </p:sp>
-        <mc:AlternateContent xmlns:mc="http://schemas.openxmlformats.org/markup-compatibility/2006">
-          <mc:Choice xmlns:a14="http://schemas.microsoft.com/office/drawing/2010/main" Requires="a14">
+        <mc:AlternateContent xmlns:mc="http://schemas.openxmlformats.org/markup-compatibility/2006" xmlns:a14="http://schemas.microsoft.com/office/drawing/2010/main">
+          <mc:Choice Requires="a14">
             <p:sp>
               <p:nvSpPr>
                 <p:cNvPr id="90" name="TextBox 89">
@@ -6399,7 +6412,7 @@
                 <a:prstGeom prst="rect">
                   <a:avLst/>
                 </a:prstGeom>
-                <a:noFill/>
+                <a:grpFill/>
               </p:spPr>
               <p:txBody>
                 <a:bodyPr wrap="square" rtlCol="0" anchor="ctr" anchorCtr="1">
@@ -6407,6 +6420,7 @@
                 </a:bodyPr>
                 <a:lstStyle/>
                 <a:p>
+                  <a:pPr/>
                   <a14:m>
                     <m:oMathPara xmlns:m="http://schemas.openxmlformats.org/officeDocument/2006/math">
                       <m:oMathParaPr>
@@ -6452,7 +6466,7 @@
               </p:txBody>
             </p:sp>
           </mc:Choice>
-          <mc:Fallback>
+          <mc:Fallback xmlns="">
             <p:sp>
               <p:nvSpPr>
                 <p:cNvPr id="90" name="TextBox 89">
@@ -6517,6 +6531,11 @@
             <a:chOff x="9859746" y="2455616"/>
             <a:chExt cx="826777" cy="875283"/>
           </a:xfrm>
+          <a:solidFill>
+            <a:schemeClr val="accent6">
+              <a:lumMod val="50000"/>
+            </a:schemeClr>
+          </a:solidFill>
         </p:grpSpPr>
         <p:sp>
           <p:nvSpPr>
@@ -6532,11 +6551,7 @@
             <a:prstGeom prst="ellipse">
               <a:avLst/>
             </a:prstGeom>
-            <a:solidFill>
-              <a:schemeClr val="accent6">
-                <a:lumMod val="75000"/>
-              </a:schemeClr>
-            </a:solidFill>
+            <a:grpFill/>
           </p:spPr>
           <p:style>
             <a:lnRef idx="2">
@@ -6567,8 +6582,8 @@
             </a:p>
           </p:txBody>
         </p:sp>
-        <mc:AlternateContent xmlns:mc="http://schemas.openxmlformats.org/markup-compatibility/2006">
-          <mc:Choice xmlns:a14="http://schemas.microsoft.com/office/drawing/2010/main" Requires="a14">
+        <mc:AlternateContent xmlns:mc="http://schemas.openxmlformats.org/markup-compatibility/2006" xmlns:a14="http://schemas.microsoft.com/office/drawing/2010/main">
+          <mc:Choice Requires="a14">
             <p:sp>
               <p:nvSpPr>
                 <p:cNvPr id="91" name="TextBox 90">
@@ -6589,7 +6604,7 @@
                 <a:prstGeom prst="rect">
                   <a:avLst/>
                 </a:prstGeom>
-                <a:noFill/>
+                <a:grpFill/>
               </p:spPr>
               <p:txBody>
                 <a:bodyPr wrap="square" rtlCol="0" anchor="ctr" anchorCtr="1">
@@ -6597,6 +6612,7 @@
                 </a:bodyPr>
                 <a:lstStyle/>
                 <a:p>
+                  <a:pPr/>
                   <a14:m>
                     <m:oMathPara xmlns:m="http://schemas.openxmlformats.org/officeDocument/2006/math">
                       <m:oMathParaPr>
@@ -6642,7 +6658,7 @@
               </p:txBody>
             </p:sp>
           </mc:Choice>
-          <mc:Fallback>
+          <mc:Fallback xmlns="">
             <p:sp>
               <p:nvSpPr>
                 <p:cNvPr id="91" name="TextBox 90">
@@ -6758,8 +6774,8 @@
             </a:p>
           </p:txBody>
         </p:sp>
-        <mc:AlternateContent xmlns:mc="http://schemas.openxmlformats.org/markup-compatibility/2006">
-          <mc:Choice xmlns:a14="http://schemas.microsoft.com/office/drawing/2010/main" Requires="a14">
+        <mc:AlternateContent xmlns:mc="http://schemas.openxmlformats.org/markup-compatibility/2006" xmlns:a14="http://schemas.microsoft.com/office/drawing/2010/main">
+          <mc:Choice Requires="a14">
             <p:sp>
               <p:nvSpPr>
                 <p:cNvPr id="92" name="TextBox 91">
@@ -6788,6 +6804,7 @@
                 </a:bodyPr>
                 <a:lstStyle/>
                 <a:p>
+                  <a:pPr/>
                   <a14:m>
                     <m:oMathPara xmlns:m="http://schemas.openxmlformats.org/officeDocument/2006/math">
                       <m:oMathParaPr>
@@ -6833,7 +6850,7 @@
               </p:txBody>
             </p:sp>
           </mc:Choice>
-          <mc:Fallback>
+          <mc:Fallback xmlns="">
             <p:sp>
               <p:nvSpPr>
                 <p:cNvPr id="92" name="TextBox 91">
@@ -6943,8 +6960,8 @@
             </a:p>
           </p:txBody>
         </p:sp>
-        <mc:AlternateContent xmlns:mc="http://schemas.openxmlformats.org/markup-compatibility/2006">
-          <mc:Choice xmlns:a14="http://schemas.microsoft.com/office/drawing/2010/main" Requires="a14">
+        <mc:AlternateContent xmlns:mc="http://schemas.openxmlformats.org/markup-compatibility/2006" xmlns:a14="http://schemas.microsoft.com/office/drawing/2010/main">
+          <mc:Choice Requires="a14">
             <p:sp>
               <p:nvSpPr>
                 <p:cNvPr id="96" name="TextBox 95">
@@ -6973,6 +6990,7 @@
                 </a:bodyPr>
                 <a:lstStyle/>
                 <a:p>
+                  <a:pPr/>
                   <a14:m>
                     <m:oMathPara xmlns:m="http://schemas.openxmlformats.org/officeDocument/2006/math">
                       <m:oMathParaPr>
@@ -7030,7 +7048,7 @@
               </p:txBody>
             </p:sp>
           </mc:Choice>
-          <mc:Fallback>
+          <mc:Fallback xmlns="">
             <p:sp>
               <p:nvSpPr>
                 <p:cNvPr id="96" name="TextBox 95">
@@ -7146,8 +7164,8 @@
             </a:p>
           </p:txBody>
         </p:sp>
-        <mc:AlternateContent xmlns:mc="http://schemas.openxmlformats.org/markup-compatibility/2006">
-          <mc:Choice xmlns:a14="http://schemas.microsoft.com/office/drawing/2010/main" Requires="a14">
+        <mc:AlternateContent xmlns:mc="http://schemas.openxmlformats.org/markup-compatibility/2006" xmlns:a14="http://schemas.microsoft.com/office/drawing/2010/main">
+          <mc:Choice Requires="a14">
             <p:sp>
               <p:nvSpPr>
                 <p:cNvPr id="97" name="TextBox 96">
@@ -7176,6 +7194,7 @@
                 </a:bodyPr>
                 <a:lstStyle/>
                 <a:p>
+                  <a:pPr/>
                   <a14:m>
                     <m:oMathPara xmlns:m="http://schemas.openxmlformats.org/officeDocument/2006/math">
                       <m:oMathParaPr>
@@ -7233,7 +7252,7 @@
               </p:txBody>
             </p:sp>
           </mc:Choice>
-          <mc:Fallback>
+          <mc:Fallback xmlns="">
             <p:sp>
               <p:nvSpPr>
                 <p:cNvPr id="97" name="TextBox 96">
@@ -7343,8 +7362,8 @@
             </a:p>
           </p:txBody>
         </p:sp>
-        <mc:AlternateContent xmlns:mc="http://schemas.openxmlformats.org/markup-compatibility/2006">
-          <mc:Choice xmlns:a14="http://schemas.microsoft.com/office/drawing/2010/main" Requires="a14">
+        <mc:AlternateContent xmlns:mc="http://schemas.openxmlformats.org/markup-compatibility/2006" xmlns:a14="http://schemas.microsoft.com/office/drawing/2010/main">
+          <mc:Choice Requires="a14">
             <p:sp>
               <p:nvSpPr>
                 <p:cNvPr id="98" name="TextBox 97">
@@ -7373,6 +7392,7 @@
                 </a:bodyPr>
                 <a:lstStyle/>
                 <a:p>
+                  <a:pPr/>
                   <a14:m>
                     <m:oMathPara xmlns:m="http://schemas.openxmlformats.org/officeDocument/2006/math">
                       <m:oMathParaPr>
@@ -7430,7 +7450,7 @@
               </p:txBody>
             </p:sp>
           </mc:Choice>
-          <mc:Fallback>
+          <mc:Fallback xmlns="">
             <p:sp>
               <p:nvSpPr>
                 <p:cNvPr id="98" name="TextBox 97">
@@ -7870,7 +7890,7 @@
           </a:prstGeom>
           <a:solidFill>
             <a:schemeClr val="accent6">
-              <a:lumMod val="75000"/>
+              <a:lumMod val="50000"/>
             </a:schemeClr>
           </a:solidFill>
         </p:spPr>
@@ -8477,8 +8497,8 @@
             </a:p>
           </p:txBody>
         </p:sp>
-        <mc:AlternateContent xmlns:mc="http://schemas.openxmlformats.org/markup-compatibility/2006">
-          <mc:Choice xmlns:a14="http://schemas.microsoft.com/office/drawing/2010/main" Requires="a14">
+        <mc:AlternateContent xmlns:mc="http://schemas.openxmlformats.org/markup-compatibility/2006" xmlns:a14="http://schemas.microsoft.com/office/drawing/2010/main">
+          <mc:Choice Requires="a14">
             <p:sp>
               <p:nvSpPr>
                 <p:cNvPr id="33" name="TextBox 32">
@@ -8507,6 +8527,7 @@
                 </a:bodyPr>
                 <a:lstStyle/>
                 <a:p>
+                  <a:pPr/>
                   <a14:m>
                     <m:oMathPara xmlns:m="http://schemas.openxmlformats.org/officeDocument/2006/math">
                       <m:oMathParaPr>
@@ -8552,7 +8573,7 @@
               </p:txBody>
             </p:sp>
           </mc:Choice>
-          <mc:Fallback>
+          <mc:Fallback xmlns="">
             <p:sp>
               <p:nvSpPr>
                 <p:cNvPr id="33" name="TextBox 32">
@@ -8662,8 +8683,8 @@
             </a:p>
           </p:txBody>
         </p:sp>
-        <mc:AlternateContent xmlns:mc="http://schemas.openxmlformats.org/markup-compatibility/2006">
-          <mc:Choice xmlns:a14="http://schemas.microsoft.com/office/drawing/2010/main" Requires="a14">
+        <mc:AlternateContent xmlns:mc="http://schemas.openxmlformats.org/markup-compatibility/2006" xmlns:a14="http://schemas.microsoft.com/office/drawing/2010/main">
+          <mc:Choice Requires="a14">
             <p:sp>
               <p:nvSpPr>
                 <p:cNvPr id="38" name="TextBox 37">
@@ -8692,6 +8713,7 @@
                 </a:bodyPr>
                 <a:lstStyle/>
                 <a:p>
+                  <a:pPr/>
                   <a14:m>
                     <m:oMathPara xmlns:m="http://schemas.openxmlformats.org/officeDocument/2006/math">
                       <m:oMathParaPr>
@@ -8749,7 +8771,7 @@
               </p:txBody>
             </p:sp>
           </mc:Choice>
-          <mc:Fallback>
+          <mc:Fallback xmlns="">
             <p:sp>
               <p:nvSpPr>
                 <p:cNvPr id="38" name="TextBox 37">
@@ -8865,8 +8887,8 @@
             </a:p>
           </p:txBody>
         </p:sp>
-        <mc:AlternateContent xmlns:mc="http://schemas.openxmlformats.org/markup-compatibility/2006">
-          <mc:Choice xmlns:a14="http://schemas.microsoft.com/office/drawing/2010/main" Requires="a14">
+        <mc:AlternateContent xmlns:mc="http://schemas.openxmlformats.org/markup-compatibility/2006" xmlns:a14="http://schemas.microsoft.com/office/drawing/2010/main">
+          <mc:Choice Requires="a14">
             <p:sp>
               <p:nvSpPr>
                 <p:cNvPr id="40" name="TextBox 39">
@@ -8895,6 +8917,7 @@
                 </a:bodyPr>
                 <a:lstStyle/>
                 <a:p>
+                  <a:pPr/>
                   <a14:m>
                     <m:oMathPara xmlns:m="http://schemas.openxmlformats.org/officeDocument/2006/math">
                       <m:oMathParaPr>
@@ -8940,7 +8963,7 @@
               </p:txBody>
             </p:sp>
           </mc:Choice>
-          <mc:Fallback>
+          <mc:Fallback xmlns="">
             <p:sp>
               <p:nvSpPr>
                 <p:cNvPr id="40" name="TextBox 39">
@@ -9050,8 +9073,8 @@
             </a:p>
           </p:txBody>
         </p:sp>
-        <mc:AlternateContent xmlns:mc="http://schemas.openxmlformats.org/markup-compatibility/2006">
-          <mc:Choice xmlns:a14="http://schemas.microsoft.com/office/drawing/2010/main" Requires="a14">
+        <mc:AlternateContent xmlns:mc="http://schemas.openxmlformats.org/markup-compatibility/2006" xmlns:a14="http://schemas.microsoft.com/office/drawing/2010/main">
+          <mc:Choice Requires="a14">
             <p:sp>
               <p:nvSpPr>
                 <p:cNvPr id="41" name="TextBox 40">
@@ -9080,6 +9103,7 @@
                 </a:bodyPr>
                 <a:lstStyle/>
                 <a:p>
+                  <a:pPr/>
                   <a14:m>
                     <m:oMathPara xmlns:m="http://schemas.openxmlformats.org/officeDocument/2006/math">
                       <m:oMathParaPr>
@@ -9137,7 +9161,7 @@
               </p:txBody>
             </p:sp>
           </mc:Choice>
-          <mc:Fallback>
+          <mc:Fallback xmlns="">
             <p:sp>
               <p:nvSpPr>
                 <p:cNvPr id="41" name="TextBox 40">
@@ -9245,8 +9269,8 @@
             </a:p>
           </p:txBody>
         </p:sp>
-        <mc:AlternateContent xmlns:mc="http://schemas.openxmlformats.org/markup-compatibility/2006">
-          <mc:Choice xmlns:a14="http://schemas.microsoft.com/office/drawing/2010/main" Requires="a14">
+        <mc:AlternateContent xmlns:mc="http://schemas.openxmlformats.org/markup-compatibility/2006" xmlns:a14="http://schemas.microsoft.com/office/drawing/2010/main">
+          <mc:Choice Requires="a14">
             <p:sp>
               <p:nvSpPr>
                 <p:cNvPr id="42" name="TextBox 41">
@@ -9275,6 +9299,7 @@
                 </a:bodyPr>
                 <a:lstStyle/>
                 <a:p>
+                  <a:pPr/>
                   <a14:m>
                     <m:oMathPara xmlns:m="http://schemas.openxmlformats.org/officeDocument/2006/math">
                       <m:oMathParaPr>
@@ -9320,7 +9345,7 @@
               </p:txBody>
             </p:sp>
           </mc:Choice>
-          <mc:Fallback>
+          <mc:Fallback xmlns="">
             <p:sp>
               <p:nvSpPr>
                 <p:cNvPr id="42" name="TextBox 41">
@@ -9366,8 +9391,8 @@
           </mc:Fallback>
         </mc:AlternateContent>
       </p:grpSp>
-      <mc:AlternateContent xmlns:mc="http://schemas.openxmlformats.org/markup-compatibility/2006">
-        <mc:Choice xmlns:a14="http://schemas.microsoft.com/office/drawing/2010/main" Requires="a14">
+      <mc:AlternateContent xmlns:mc="http://schemas.openxmlformats.org/markup-compatibility/2006" xmlns:a14="http://schemas.microsoft.com/office/drawing/2010/main">
+        <mc:Choice Requires="a14">
           <p:sp>
             <p:nvSpPr>
               <p:cNvPr id="45" name="TextBox 44">
@@ -9396,6 +9421,7 @@
               </a:bodyPr>
               <a:lstStyle/>
               <a:p>
+                <a:pPr/>
                 <a14:m>
                   <m:oMathPara xmlns:m="http://schemas.openxmlformats.org/officeDocument/2006/math">
                     <m:oMathParaPr>
@@ -9441,7 +9467,7 @@
             </p:txBody>
           </p:sp>
         </mc:Choice>
-        <mc:Fallback>
+        <mc:Fallback xmlns="">
           <p:sp>
             <p:nvSpPr>
               <p:cNvPr id="45" name="TextBox 44">
@@ -9486,8 +9512,8 @@
           </p:sp>
         </mc:Fallback>
       </mc:AlternateContent>
-      <mc:AlternateContent xmlns:mc="http://schemas.openxmlformats.org/markup-compatibility/2006">
-        <mc:Choice xmlns:a14="http://schemas.microsoft.com/office/drawing/2010/main" Requires="a14">
+      <mc:AlternateContent xmlns:mc="http://schemas.openxmlformats.org/markup-compatibility/2006" xmlns:a14="http://schemas.microsoft.com/office/drawing/2010/main">
+        <mc:Choice Requires="a14">
           <p:sp>
             <p:nvSpPr>
               <p:cNvPr id="47" name="TextBox 46">
@@ -9516,6 +9542,7 @@
               </a:bodyPr>
               <a:lstStyle/>
               <a:p>
+                <a:pPr/>
                 <a14:m>
                   <m:oMathPara xmlns:m="http://schemas.openxmlformats.org/officeDocument/2006/math">
                     <m:oMathParaPr>
@@ -9561,7 +9588,7 @@
             </p:txBody>
           </p:sp>
         </mc:Choice>
-        <mc:Fallback>
+        <mc:Fallback xmlns="">
           <p:sp>
             <p:nvSpPr>
               <p:cNvPr id="47" name="TextBox 46">
@@ -9606,8 +9633,8 @@
           </p:sp>
         </mc:Fallback>
       </mc:AlternateContent>
-      <mc:AlternateContent xmlns:mc="http://schemas.openxmlformats.org/markup-compatibility/2006">
-        <mc:Choice xmlns:a14="http://schemas.microsoft.com/office/drawing/2010/main" Requires="a14">
+      <mc:AlternateContent xmlns:mc="http://schemas.openxmlformats.org/markup-compatibility/2006" xmlns:a14="http://schemas.microsoft.com/office/drawing/2010/main">
+        <mc:Choice Requires="a14">
           <p:sp>
             <p:nvSpPr>
               <p:cNvPr id="48" name="TextBox 47">
@@ -9636,6 +9663,7 @@
               </a:bodyPr>
               <a:lstStyle/>
               <a:p>
+                <a:pPr/>
                 <a14:m>
                   <m:oMathPara xmlns:m="http://schemas.openxmlformats.org/officeDocument/2006/math">
                     <m:oMathParaPr>
@@ -9693,7 +9721,7 @@
             </p:txBody>
           </p:sp>
         </mc:Choice>
-        <mc:Fallback>
+        <mc:Fallback xmlns="">
           <p:sp>
             <p:nvSpPr>
               <p:cNvPr id="48" name="TextBox 47">

</xml_diff>